<commit_message>
Refine Milestone 5: Update README and rearrange presentation slides
</commit_message>
<xml_diff>
--- a/6_final_presentation/Humanitarian Crisis Intelligence & Communication System (HCICS.pptx
+++ b/6_final_presentation/Humanitarian Crisis Intelligence & Communication System (HCICS.pptx
@@ -20,18 +20,18 @@
     <p:sldId id="265" r:id="rId11"/>
     <p:sldId id="266" r:id="rId12"/>
     <p:sldId id="267" r:id="rId13"/>
-    <p:sldId id="268" r:id="rId14"/>
-    <p:sldId id="269" r:id="rId15"/>
-    <p:sldId id="270" r:id="rId16"/>
-    <p:sldId id="271" r:id="rId17"/>
-    <p:sldId id="272" r:id="rId18"/>
+    <p:sldId id="272" r:id="rId14"/>
+    <p:sldId id="268" r:id="rId15"/>
+    <p:sldId id="269" r:id="rId16"/>
+    <p:sldId id="270" r:id="rId17"/>
+    <p:sldId id="271" r:id="rId18"/>
     <p:sldId id="273" r:id="rId19"/>
-    <p:sldId id="274" r:id="rId20"/>
-    <p:sldId id="275" r:id="rId21"/>
-    <p:sldId id="276" r:id="rId22"/>
-    <p:sldId id="277" r:id="rId23"/>
-    <p:sldId id="278" r:id="rId24"/>
-    <p:sldId id="279" r:id="rId25"/>
+    <p:sldId id="279" r:id="rId20"/>
+    <p:sldId id="274" r:id="rId21"/>
+    <p:sldId id="275" r:id="rId22"/>
+    <p:sldId id="276" r:id="rId23"/>
+    <p:sldId id="277" r:id="rId24"/>
+    <p:sldId id="278" r:id="rId25"/>
     <p:sldId id="281" r:id="rId26"/>
     <p:sldId id="280" r:id="rId27"/>
   </p:sldIdLst>
@@ -132,6 +132,11 @@
       </a:defRPr>
     </a:lvl9pPr>
   </p:defaultTextStyle>
+  <p:extLst>
+    <p:ext uri="{EFAFB233-063F-42B5-8137-9DF3F51BA10A}">
+      <p15:sldGuideLst xmlns:p15="http://schemas.microsoft.com/office/powerpoint/2012/main"/>
+    </p:ext>
+  </p:extLst>
 </p:presentation>
 </file>
 
@@ -217,7 +222,7 @@
           <a:p>
             <a:fld id="{86DF9EBA-E4C1-4F50-965C-92328292065E}" type="datetimeFigureOut">
               <a:rPr lang="en-US" smtClean="0"/>
-              <a:t>12/7/2025</a:t>
+              <a:t>12/8/2025</a:t>
             </a:fld>
             <a:endParaRPr lang="en-US"/>
           </a:p>
@@ -656,7 +661,7 @@
           <a:p>
             <a:fld id="{FDCEEAB2-FF25-4093-AB36-60135CDFE685}" type="datetime1">
               <a:rPr lang="en-US" smtClean="0"/>
-              <a:t>12/7/2025</a:t>
+              <a:t>12/8/2025</a:t>
             </a:fld>
             <a:endParaRPr lang="en-US"/>
           </a:p>
@@ -854,7 +859,7 @@
           <a:p>
             <a:fld id="{685E9A07-954E-4639-9D9F-12E402CDBBC1}" type="datetime1">
               <a:rPr lang="en-US" smtClean="0"/>
-              <a:t>12/7/2025</a:t>
+              <a:t>12/8/2025</a:t>
             </a:fld>
             <a:endParaRPr lang="en-US"/>
           </a:p>
@@ -1062,7 +1067,7 @@
           <a:p>
             <a:fld id="{E7D9FEA9-C8D2-4986-995E-ACCFFFB0DD5B}" type="datetime1">
               <a:rPr lang="en-US" smtClean="0"/>
-              <a:t>12/7/2025</a:t>
+              <a:t>12/8/2025</a:t>
             </a:fld>
             <a:endParaRPr lang="en-US"/>
           </a:p>
@@ -1268,7 +1273,7 @@
           <a:p>
             <a:fld id="{697DB575-320D-417F-B42C-7CDAC6F80BE9}" type="datetime1">
               <a:rPr lang="en-US" smtClean="0"/>
-              <a:t>12/7/2025</a:t>
+              <a:t>12/8/2025</a:t>
             </a:fld>
             <a:endParaRPr lang="en-US"/>
           </a:p>
@@ -1543,7 +1548,7 @@
           <a:p>
             <a:fld id="{E8876044-AA9F-454F-9409-7FCE4B51C96F}" type="datetime1">
               <a:rPr lang="en-US" smtClean="0"/>
-              <a:t>12/7/2025</a:t>
+              <a:t>12/8/2025</a:t>
             </a:fld>
             <a:endParaRPr lang="en-US"/>
           </a:p>
@@ -1808,7 +1813,7 @@
           <a:p>
             <a:fld id="{6E65ED52-1D97-4162-A20B-F2E89ED70C7E}" type="datetime1">
               <a:rPr lang="en-US" smtClean="0"/>
-              <a:t>12/7/2025</a:t>
+              <a:t>12/8/2025</a:t>
             </a:fld>
             <a:endParaRPr lang="en-US"/>
           </a:p>
@@ -2220,7 +2225,7 @@
           <a:p>
             <a:fld id="{275C669B-D651-448F-95A4-06F955DC79A6}" type="datetime1">
               <a:rPr lang="en-US" smtClean="0"/>
-              <a:t>12/7/2025</a:t>
+              <a:t>12/8/2025</a:t>
             </a:fld>
             <a:endParaRPr lang="en-US"/>
           </a:p>
@@ -2361,7 +2366,7 @@
           <a:p>
             <a:fld id="{2B25B4E0-EC4D-498C-9580-CE3C9252C125}" type="datetime1">
               <a:rPr lang="en-US" smtClean="0"/>
-              <a:t>12/7/2025</a:t>
+              <a:t>12/8/2025</a:t>
             </a:fld>
             <a:endParaRPr lang="en-US"/>
           </a:p>
@@ -2474,7 +2479,7 @@
           <a:p>
             <a:fld id="{2437F752-5DF1-48D8-8DB4-CB6EE89010D1}" type="datetime1">
               <a:rPr lang="en-US" smtClean="0"/>
-              <a:t>12/7/2025</a:t>
+              <a:t>12/8/2025</a:t>
             </a:fld>
             <a:endParaRPr lang="en-US"/>
           </a:p>
@@ -2785,7 +2790,7 @@
           <a:p>
             <a:fld id="{5A1CC625-F8A5-4646-91A2-6A5F4814EC0C}" type="datetime1">
               <a:rPr lang="en-US" smtClean="0"/>
-              <a:t>12/7/2025</a:t>
+              <a:t>12/8/2025</a:t>
             </a:fld>
             <a:endParaRPr lang="en-US"/>
           </a:p>
@@ -3073,7 +3078,7 @@
           <a:p>
             <a:fld id="{E893AD99-D0C6-4531-9239-3736AD61331E}" type="datetime1">
               <a:rPr lang="en-US" smtClean="0"/>
-              <a:t>12/7/2025</a:t>
+              <a:t>12/8/2025</a:t>
             </a:fld>
             <a:endParaRPr lang="en-US"/>
           </a:p>
@@ -3317,7 +3322,7 @@
           <a:p>
             <a:fld id="{76B4CD47-A344-4DF3-8455-D48ABF7788F7}" type="datetime1">
               <a:rPr lang="en-US" smtClean="0"/>
-              <a:t>12/7/2025</a:t>
+              <a:t>12/8/2025</a:t>
             </a:fld>
             <a:endParaRPr lang="en-US"/>
           </a:p>
@@ -4514,7 +4519,7 @@
           <p:cNvPr id="2" name="Title 1">
             <a:extLst>
               <a:ext uri="{FF2B5EF4-FFF2-40B4-BE49-F238E27FC236}">
-                <a16:creationId xmlns:a16="http://schemas.microsoft.com/office/drawing/2014/main" id="{C9DDFB32-066D-FCEE-742D-70C16AE00B57}"/>
+                <a16:creationId xmlns:a16="http://schemas.microsoft.com/office/drawing/2014/main" id="{A82177E1-F968-623B-FD15-C44FE404F534}"/>
               </a:ext>
             </a:extLst>
           </p:cNvPr>
@@ -4532,7 +4537,7 @@
           <a:p>
             <a:r>
               <a:rPr lang="en-US" dirty="0"/>
-              <a:t>Key Finding #1 - The Accessibility Crisis</a:t>
+              <a:t>Phase 5 - Dashboard Communication</a:t>
             </a:r>
           </a:p>
         </p:txBody>
@@ -4542,7 +4547,7 @@
           <p:cNvPr id="3" name="Content Placeholder 2">
             <a:extLst>
               <a:ext uri="{FF2B5EF4-FFF2-40B4-BE49-F238E27FC236}">
-                <a16:creationId xmlns:a16="http://schemas.microsoft.com/office/drawing/2014/main" id="{1BF6ECA7-3F7A-F9F1-D6F0-F96DBCBEE307}"/>
+                <a16:creationId xmlns:a16="http://schemas.microsoft.com/office/drawing/2014/main" id="{CB513A17-E0B1-6703-A863-5AC3DE21A37C}"/>
               </a:ext>
             </a:extLst>
           </p:cNvPr>
@@ -4555,72 +4560,88 @@
         </p:nvSpPr>
         <p:spPr/>
         <p:txBody>
-          <a:bodyPr/>
+          <a:bodyPr>
+            <a:normAutofit/>
+          </a:bodyPr>
           <a:lstStyle/>
           <a:p>
             <a:r>
               <a:rPr lang="en-US" b="1" dirty="0"/>
-              <a:t>86% of localities exceed 20km threshold</a:t>
+              <a:t>Interactive Features:</a:t>
             </a:r>
             <a:endParaRPr lang="en-US" dirty="0"/>
           </a:p>
           <a:p>
-            <a:r>
-              <a:rPr lang="en-US" dirty="0"/>
-              <a:t>Mean distance: </a:t>
-            </a:r>
+            <a:pPr lvl="1"/>
+            <a:r>
+              <a:rPr lang="en-US" dirty="0"/>
+              <a:t>🗺️ Interactive vulnerability map (Folium)</a:t>
+            </a:r>
+          </a:p>
+          <a:p>
+            <a:pPr lvl="1"/>
+            <a:r>
+              <a:rPr lang="en-US" dirty="0"/>
+              <a:t>📊 Real-time KPI metrics</a:t>
+            </a:r>
+          </a:p>
+          <a:p>
+            <a:pPr lvl="1"/>
+            <a:r>
+              <a:rPr lang="en-US" dirty="0"/>
+              <a:t>📈 Statistical validation charts</a:t>
+            </a:r>
+          </a:p>
+          <a:p>
+            <a:pPr lvl="1"/>
+            <a:r>
+              <a:rPr lang="en-US" dirty="0"/>
+              <a:t>📥 Export functionality (CSV, </a:t>
+            </a:r>
+            <a:r>
+              <a:rPr lang="en-US" dirty="0" err="1"/>
+              <a:t>GeoJSON</a:t>
+            </a:r>
+            <a:r>
+              <a:rPr lang="en-US" dirty="0"/>
+              <a:t>)</a:t>
+            </a:r>
+          </a:p>
+          <a:p>
             <a:r>
               <a:rPr lang="en-US" b="1" dirty="0"/>
-              <a:t>88.1km</a:t>
-            </a:r>
-            <a:r>
-              <a:rPr lang="en-US" dirty="0"/>
-              <a:t> to nearest hospital</a:t>
-            </a:r>
-          </a:p>
-          <a:p>
-            <a:r>
-              <a:rPr lang="en-US" b="1" dirty="0"/>
-              <a:t>17.6× WHO recommended maximum</a:t>
-            </a:r>
-            <a:r>
-              <a:rPr lang="en-US" dirty="0"/>
-              <a:t> (5km)</a:t>
-            </a:r>
-          </a:p>
-          <a:p>
-            <a:r>
-              <a:rPr lang="en-US" b="1" dirty="0"/>
-              <a:t>5.09M IDPs</a:t>
-            </a:r>
-            <a:r>
-              <a:rPr lang="en-US" dirty="0"/>
-              <a:t> severely underserved</a:t>
-            </a:r>
-          </a:p>
-          <a:p>
-            <a:r>
-              <a:rPr lang="en-US" b="1" dirty="0"/>
-              <a:t>156 localities</a:t>
-            </a:r>
-            <a:r>
-              <a:rPr lang="en-US" dirty="0"/>
-              <a:t> require mobile health clinics</a:t>
-            </a:r>
-          </a:p>
-          <a:p>
-            <a:r>
-              <a:rPr lang="en-US" b="1" dirty="0"/>
-              <a:t>Implication:</a:t>
-            </a:r>
-            <a:r>
-              <a:rPr lang="en-US" dirty="0"/>
-              <a:t> Fixed infrastructure expansion insufficient</a:t>
-            </a:r>
-          </a:p>
-          <a:p>
+              <a:t>Architecture:</a:t>
+            </a:r>
             <a:endParaRPr lang="en-US" dirty="0"/>
           </a:p>
+          <a:p>
+            <a:pPr lvl="1"/>
+            <a:r>
+              <a:rPr lang="en-US" dirty="0"/>
+              <a:t>Modular design (easy to extend)</a:t>
+            </a:r>
+          </a:p>
+          <a:p>
+            <a:pPr lvl="1"/>
+            <a:r>
+              <a:rPr lang="en-US" dirty="0" err="1"/>
+              <a:t>Streamlit</a:t>
+            </a:r>
+            <a:r>
+              <a:rPr lang="en-US" dirty="0"/>
+              <a:t> framework</a:t>
+            </a:r>
+          </a:p>
+          <a:p>
+            <a:pPr lvl="1"/>
+            <a:r>
+              <a:rPr lang="en-US" dirty="0"/>
+              <a:t>Responsive layout</a:t>
+            </a:r>
+          </a:p>
+          <a:p>
+            <a:endParaRPr lang="en-US" dirty="0"/>
+          </a:p>
         </p:txBody>
       </p:sp>
       <p:sp>
@@ -4628,7 +4649,7 @@
           <p:cNvPr id="4" name="Slide Number Placeholder 3">
             <a:extLst>
               <a:ext uri="{FF2B5EF4-FFF2-40B4-BE49-F238E27FC236}">
-                <a16:creationId xmlns:a16="http://schemas.microsoft.com/office/drawing/2014/main" id="{C7EF92B2-8748-ADE0-CF86-ED19BFDCBE84}"/>
+                <a16:creationId xmlns:a16="http://schemas.microsoft.com/office/drawing/2014/main" id="{83B4259A-DF96-E0D1-EE06-D38A164870EF}"/>
               </a:ext>
             </a:extLst>
           </p:cNvPr>
@@ -4655,7 +4676,7 @@
     </p:spTree>
     <p:extLst>
       <p:ext uri="{BB962C8B-B14F-4D97-AF65-F5344CB8AC3E}">
-        <p14:creationId xmlns:p14="http://schemas.microsoft.com/office/powerpoint/2010/main" val="1170397368"/>
+        <p14:creationId xmlns:p14="http://schemas.microsoft.com/office/powerpoint/2010/main" val="1551863004"/>
       </p:ext>
     </p:extLst>
   </p:cSld>
@@ -4687,7 +4708,7 @@
           <p:cNvPr id="2" name="Title 1">
             <a:extLst>
               <a:ext uri="{FF2B5EF4-FFF2-40B4-BE49-F238E27FC236}">
-                <a16:creationId xmlns:a16="http://schemas.microsoft.com/office/drawing/2014/main" id="{650689B1-7A35-BC39-2403-33295B3DF33B}"/>
+                <a16:creationId xmlns:a16="http://schemas.microsoft.com/office/drawing/2014/main" id="{C9DDFB32-066D-FCEE-742D-70C16AE00B57}"/>
               </a:ext>
             </a:extLst>
           </p:cNvPr>
@@ -4705,7 +4726,7 @@
           <a:p>
             <a:r>
               <a:rPr lang="en-US" dirty="0"/>
-              <a:t>Key Finding #2 - The Darfur Paradox</a:t>
+              <a:t>Key Finding #1 - The Accessibility Crisis</a:t>
             </a:r>
           </a:p>
         </p:txBody>
@@ -4715,7 +4736,7 @@
           <p:cNvPr id="3" name="Content Placeholder 2">
             <a:extLst>
               <a:ext uri="{FF2B5EF4-FFF2-40B4-BE49-F238E27FC236}">
-                <a16:creationId xmlns:a16="http://schemas.microsoft.com/office/drawing/2014/main" id="{F194615D-448F-1FD9-C624-96CC0D1D7FCB}"/>
+                <a16:creationId xmlns:a16="http://schemas.microsoft.com/office/drawing/2014/main" id="{1BF6ECA7-3F7A-F9F1-D6F0-F96DBCBEE307}"/>
               </a:ext>
             </a:extLst>
           </p:cNvPr>
@@ -4733,62 +4754,67 @@
           <a:p>
             <a:r>
               <a:rPr lang="en-US" b="1" dirty="0"/>
-              <a:t>Counterintuitive Result:</a:t>
+              <a:t>86% of localities exceed 20km threshold</a:t>
             </a:r>
             <a:endParaRPr lang="en-US" dirty="0"/>
           </a:p>
           <a:p>
-            <a:pPr lvl="1"/>
-            <a:r>
-              <a:rPr lang="en-US" dirty="0"/>
-              <a:t>Darfur vulnerability: 31.90</a:t>
-            </a:r>
-          </a:p>
-          <a:p>
-            <a:pPr lvl="1"/>
-            <a:r>
-              <a:rPr lang="en-US" dirty="0"/>
-              <a:t>Non-Darfur vulnerability: 42.33</a:t>
-            </a:r>
-          </a:p>
-          <a:p>
-            <a:pPr lvl="1"/>
-            <a:r>
-              <a:rPr lang="en-US" dirty="0"/>
-              <a:t>Statistical difference: p &lt; 0.001</a:t>
-            </a:r>
-          </a:p>
-          <a:p>
+            <a:r>
+              <a:rPr lang="en-US" dirty="0"/>
+              <a:t>Mean distance: </a:t>
+            </a:r>
             <a:r>
               <a:rPr lang="en-US" b="1" dirty="0"/>
-              <a:t>Why?</a:t>
-            </a:r>
+              <a:t>88.1km</a:t>
+            </a:r>
+            <a:r>
+              <a:rPr lang="en-US" dirty="0"/>
+              <a:t> to nearest hospital</a:t>
+            </a:r>
+          </a:p>
+          <a:p>
+            <a:r>
+              <a:rPr lang="en-US" b="1" dirty="0"/>
+              <a:t>17.6× WHO recommended maximum</a:t>
+            </a:r>
+            <a:r>
+              <a:rPr lang="en-US" dirty="0"/>
+              <a:t> (5km)</a:t>
+            </a:r>
+          </a:p>
+          <a:p>
+            <a:r>
+              <a:rPr lang="en-US" b="1" dirty="0"/>
+              <a:t>5.09M IDPs</a:t>
+            </a:r>
+            <a:r>
+              <a:rPr lang="en-US" dirty="0"/>
+              <a:t> severely underserved</a:t>
+            </a:r>
+          </a:p>
+          <a:p>
+            <a:r>
+              <a:rPr lang="en-US" b="1" dirty="0"/>
+              <a:t>156 localities</a:t>
+            </a:r>
+            <a:r>
+              <a:rPr lang="en-US" dirty="0"/>
+              <a:t> require mobile health clinics</a:t>
+            </a:r>
+          </a:p>
+          <a:p>
+            <a:r>
+              <a:rPr lang="en-US" b="1" dirty="0"/>
+              <a:t>Implication:</a:t>
+            </a:r>
+            <a:r>
+              <a:rPr lang="en-US" dirty="0"/>
+              <a:t> Fixed infrastructure expansion insufficient</a:t>
+            </a:r>
+          </a:p>
+          <a:p>
             <a:endParaRPr lang="en-US" dirty="0"/>
           </a:p>
-          <a:p>
-            <a:pPr lvl="1"/>
-            <a:r>
-              <a:rPr lang="en-US" dirty="0"/>
-              <a:t>Outward displacement (IDPs fled FROM Darfur)</a:t>
-            </a:r>
-          </a:p>
-          <a:p>
-            <a:pPr lvl="1"/>
-            <a:r>
-              <a:rPr lang="en-US" dirty="0"/>
-              <a:t>Receiving regions overwhelmed (River Nile, Red Sea)</a:t>
-            </a:r>
-          </a:p>
-          <a:p>
-            <a:pPr lvl="1"/>
-            <a:r>
-              <a:rPr lang="en-US" dirty="0"/>
-              <a:t>Data capture limitations in conflict zones</a:t>
-            </a:r>
-          </a:p>
-          <a:p>
-            <a:endParaRPr lang="en-US" dirty="0"/>
-          </a:p>
         </p:txBody>
       </p:sp>
       <p:sp>
@@ -4796,7 +4822,7 @@
           <p:cNvPr id="4" name="Slide Number Placeholder 3">
             <a:extLst>
               <a:ext uri="{FF2B5EF4-FFF2-40B4-BE49-F238E27FC236}">
-                <a16:creationId xmlns:a16="http://schemas.microsoft.com/office/drawing/2014/main" id="{993A9C19-3D3D-3355-3845-C8F53D469105}"/>
+                <a16:creationId xmlns:a16="http://schemas.microsoft.com/office/drawing/2014/main" id="{C7EF92B2-8748-ADE0-CF86-ED19BFDCBE84}"/>
               </a:ext>
             </a:extLst>
           </p:cNvPr>
@@ -4815,6 +4841,174 @@
             <a:fld id="{15ACE215-56CB-44C9-AFFD-7788C360CC10}" type="slidenum">
               <a:rPr lang="en-US" smtClean="0"/>
               <a:t>14</a:t>
+            </a:fld>
+            <a:endParaRPr lang="en-US"/>
+          </a:p>
+        </p:txBody>
+      </p:sp>
+    </p:spTree>
+    <p:extLst>
+      <p:ext uri="{BB962C8B-B14F-4D97-AF65-F5344CB8AC3E}">
+        <p14:creationId xmlns:p14="http://schemas.microsoft.com/office/powerpoint/2010/main" val="1170397368"/>
+      </p:ext>
+    </p:extLst>
+  </p:cSld>
+  <p:clrMapOvr>
+    <a:masterClrMapping/>
+  </p:clrMapOvr>
+</p:sld>
+</file>
+
+<file path=ppt/slides/slide15.xml><?xml version="1.0" encoding="utf-8"?>
+<p:sld xmlns:a="http://schemas.openxmlformats.org/drawingml/2006/main" xmlns:r="http://schemas.openxmlformats.org/officeDocument/2006/relationships" xmlns:p="http://schemas.openxmlformats.org/presentationml/2006/main">
+  <p:cSld>
+    <p:spTree>
+      <p:nvGrpSpPr>
+        <p:cNvPr id="1" name=""/>
+        <p:cNvGrpSpPr/>
+        <p:nvPr/>
+      </p:nvGrpSpPr>
+      <p:grpSpPr>
+        <a:xfrm>
+          <a:off x="0" y="0"/>
+          <a:ext cx="0" cy="0"/>
+          <a:chOff x="0" y="0"/>
+          <a:chExt cx="0" cy="0"/>
+        </a:xfrm>
+      </p:grpSpPr>
+      <p:sp>
+        <p:nvSpPr>
+          <p:cNvPr id="2" name="Title 1">
+            <a:extLst>
+              <a:ext uri="{FF2B5EF4-FFF2-40B4-BE49-F238E27FC236}">
+                <a16:creationId xmlns:a16="http://schemas.microsoft.com/office/drawing/2014/main" id="{650689B1-7A35-BC39-2403-33295B3DF33B}"/>
+              </a:ext>
+            </a:extLst>
+          </p:cNvPr>
+          <p:cNvSpPr>
+            <a:spLocks noGrp="1"/>
+          </p:cNvSpPr>
+          <p:nvPr>
+            <p:ph type="title"/>
+          </p:nvPr>
+        </p:nvSpPr>
+        <p:spPr/>
+        <p:txBody>
+          <a:bodyPr/>
+          <a:lstStyle/>
+          <a:p>
+            <a:r>
+              <a:rPr lang="en-US" dirty="0"/>
+              <a:t>Key Finding #2 - The Darfur Paradox</a:t>
+            </a:r>
+          </a:p>
+        </p:txBody>
+      </p:sp>
+      <p:sp>
+        <p:nvSpPr>
+          <p:cNvPr id="3" name="Content Placeholder 2">
+            <a:extLst>
+              <a:ext uri="{FF2B5EF4-FFF2-40B4-BE49-F238E27FC236}">
+                <a16:creationId xmlns:a16="http://schemas.microsoft.com/office/drawing/2014/main" id="{F194615D-448F-1FD9-C624-96CC0D1D7FCB}"/>
+              </a:ext>
+            </a:extLst>
+          </p:cNvPr>
+          <p:cNvSpPr>
+            <a:spLocks noGrp="1"/>
+          </p:cNvSpPr>
+          <p:nvPr>
+            <p:ph idx="1"/>
+          </p:nvPr>
+        </p:nvSpPr>
+        <p:spPr/>
+        <p:txBody>
+          <a:bodyPr/>
+          <a:lstStyle/>
+          <a:p>
+            <a:r>
+              <a:rPr lang="en-US" b="1" dirty="0"/>
+              <a:t>Counterintuitive Result:</a:t>
+            </a:r>
+            <a:endParaRPr lang="en-US" dirty="0"/>
+          </a:p>
+          <a:p>
+            <a:pPr lvl="1"/>
+            <a:r>
+              <a:rPr lang="en-US" dirty="0"/>
+              <a:t>Darfur vulnerability: 31.90</a:t>
+            </a:r>
+          </a:p>
+          <a:p>
+            <a:pPr lvl="1"/>
+            <a:r>
+              <a:rPr lang="en-US" dirty="0"/>
+              <a:t>Non-Darfur vulnerability: 42.33</a:t>
+            </a:r>
+          </a:p>
+          <a:p>
+            <a:pPr lvl="1"/>
+            <a:r>
+              <a:rPr lang="en-US" dirty="0"/>
+              <a:t>Statistical difference: p &lt; 0.001</a:t>
+            </a:r>
+          </a:p>
+          <a:p>
+            <a:r>
+              <a:rPr lang="en-US" b="1" dirty="0"/>
+              <a:t>Why?</a:t>
+            </a:r>
+            <a:endParaRPr lang="en-US" dirty="0"/>
+          </a:p>
+          <a:p>
+            <a:pPr lvl="1"/>
+            <a:r>
+              <a:rPr lang="en-US" dirty="0"/>
+              <a:t>Outward displacement (IDPs fled FROM Darfur)</a:t>
+            </a:r>
+          </a:p>
+          <a:p>
+            <a:pPr lvl="1"/>
+            <a:r>
+              <a:rPr lang="en-US" dirty="0"/>
+              <a:t>Receiving regions overwhelmed (River Nile, Red Sea)</a:t>
+            </a:r>
+          </a:p>
+          <a:p>
+            <a:pPr lvl="1"/>
+            <a:r>
+              <a:rPr lang="en-US" dirty="0"/>
+              <a:t>Data capture limitations in conflict zones</a:t>
+            </a:r>
+          </a:p>
+          <a:p>
+            <a:endParaRPr lang="en-US" dirty="0"/>
+          </a:p>
+        </p:txBody>
+      </p:sp>
+      <p:sp>
+        <p:nvSpPr>
+          <p:cNvPr id="4" name="Slide Number Placeholder 3">
+            <a:extLst>
+              <a:ext uri="{FF2B5EF4-FFF2-40B4-BE49-F238E27FC236}">
+                <a16:creationId xmlns:a16="http://schemas.microsoft.com/office/drawing/2014/main" id="{993A9C19-3D3D-3355-3845-C8F53D469105}"/>
+              </a:ext>
+            </a:extLst>
+          </p:cNvPr>
+          <p:cNvSpPr>
+            <a:spLocks noGrp="1"/>
+          </p:cNvSpPr>
+          <p:nvPr>
+            <p:ph type="sldNum" sz="quarter" idx="12"/>
+          </p:nvPr>
+        </p:nvSpPr>
+        <p:spPr/>
+        <p:txBody>
+          <a:bodyPr/>
+          <a:lstStyle/>
+          <a:p>
+            <a:fld id="{15ACE215-56CB-44C9-AFFD-7788C360CC10}" type="slidenum">
+              <a:rPr lang="en-US" smtClean="0"/>
+              <a:t>15</a:t>
             </a:fld>
             <a:endParaRPr lang="en-US"/>
           </a:p>
@@ -4833,7 +5027,7 @@
 </p:sld>
 </file>
 
-<file path=ppt/slides/slide15.xml><?xml version="1.0" encoding="utf-8"?>
+<file path=ppt/slides/slide16.xml><?xml version="1.0" encoding="utf-8"?>
 <p:sld xmlns:a="http://schemas.openxmlformats.org/drawingml/2006/main" xmlns:r="http://schemas.openxmlformats.org/officeDocument/2006/relationships" xmlns:p="http://schemas.openxmlformats.org/presentationml/2006/main">
   <p:cSld>
     <p:spTree>
@@ -5495,7 +5689,7 @@
           <a:p>
             <a:fld id="{15ACE215-56CB-44C9-AFFD-7788C360CC10}" type="slidenum">
               <a:rPr lang="en-US" smtClean="0"/>
-              <a:t>15</a:t>
+              <a:t>16</a:t>
             </a:fld>
             <a:endParaRPr lang="en-US"/>
           </a:p>
@@ -5665,7 +5859,7 @@
 </p:sld>
 </file>
 
-<file path=ppt/slides/slide16.xml><?xml version="1.0" encoding="utf-8"?>
+<file path=ppt/slides/slide17.xml><?xml version="1.0" encoding="utf-8"?>
 <p:sld xmlns:a="http://schemas.openxmlformats.org/drawingml/2006/main" xmlns:r="http://schemas.openxmlformats.org/officeDocument/2006/relationships" xmlns:p="http://schemas.openxmlformats.org/presentationml/2006/main">
   <p:cSld>
     <p:spTree>
@@ -5807,7 +6001,7 @@
             <a:fld id="{15ACE215-56CB-44C9-AFFD-7788C360CC10}" type="slidenum">
               <a:rPr lang="en-US" smtClean="0"/>
               <a:pPr/>
-              <a:t>16</a:t>
+              <a:t>17</a:t>
             </a:fld>
             <a:endParaRPr lang="en-US"/>
           </a:p>
@@ -6032,195 +6226,6 @@
 </p:sld>
 </file>
 
-<file path=ppt/slides/slide17.xml><?xml version="1.0" encoding="utf-8"?>
-<p:sld xmlns:a="http://schemas.openxmlformats.org/drawingml/2006/main" xmlns:r="http://schemas.openxmlformats.org/officeDocument/2006/relationships" xmlns:p="http://schemas.openxmlformats.org/presentationml/2006/main">
-  <p:cSld>
-    <p:spTree>
-      <p:nvGrpSpPr>
-        <p:cNvPr id="1" name=""/>
-        <p:cNvGrpSpPr/>
-        <p:nvPr/>
-      </p:nvGrpSpPr>
-      <p:grpSpPr>
-        <a:xfrm>
-          <a:off x="0" y="0"/>
-          <a:ext cx="0" cy="0"/>
-          <a:chOff x="0" y="0"/>
-          <a:chExt cx="0" cy="0"/>
-        </a:xfrm>
-      </p:grpSpPr>
-      <p:sp>
-        <p:nvSpPr>
-          <p:cNvPr id="2" name="Title 1">
-            <a:extLst>
-              <a:ext uri="{FF2B5EF4-FFF2-40B4-BE49-F238E27FC236}">
-                <a16:creationId xmlns:a16="http://schemas.microsoft.com/office/drawing/2014/main" id="{A82177E1-F968-623B-FD15-C44FE404F534}"/>
-              </a:ext>
-            </a:extLst>
-          </p:cNvPr>
-          <p:cNvSpPr>
-            <a:spLocks noGrp="1"/>
-          </p:cNvSpPr>
-          <p:nvPr>
-            <p:ph type="title"/>
-          </p:nvPr>
-        </p:nvSpPr>
-        <p:spPr/>
-        <p:txBody>
-          <a:bodyPr/>
-          <a:lstStyle/>
-          <a:p>
-            <a:r>
-              <a:rPr lang="en-US" dirty="0"/>
-              <a:t>Phase 5 - Dashboard Communication</a:t>
-            </a:r>
-          </a:p>
-        </p:txBody>
-      </p:sp>
-      <p:sp>
-        <p:nvSpPr>
-          <p:cNvPr id="3" name="Content Placeholder 2">
-            <a:extLst>
-              <a:ext uri="{FF2B5EF4-FFF2-40B4-BE49-F238E27FC236}">
-                <a16:creationId xmlns:a16="http://schemas.microsoft.com/office/drawing/2014/main" id="{CB513A17-E0B1-6703-A863-5AC3DE21A37C}"/>
-              </a:ext>
-            </a:extLst>
-          </p:cNvPr>
-          <p:cNvSpPr>
-            <a:spLocks noGrp="1"/>
-          </p:cNvSpPr>
-          <p:nvPr>
-            <p:ph idx="1"/>
-          </p:nvPr>
-        </p:nvSpPr>
-        <p:spPr/>
-        <p:txBody>
-          <a:bodyPr>
-            <a:normAutofit/>
-          </a:bodyPr>
-          <a:lstStyle/>
-          <a:p>
-            <a:r>
-              <a:rPr lang="en-US" b="1" dirty="0"/>
-              <a:t>Interactive Features:</a:t>
-            </a:r>
-            <a:endParaRPr lang="en-US" dirty="0"/>
-          </a:p>
-          <a:p>
-            <a:pPr lvl="1"/>
-            <a:r>
-              <a:rPr lang="en-US" dirty="0"/>
-              <a:t>🗺️ Interactive vulnerability map (Folium)</a:t>
-            </a:r>
-          </a:p>
-          <a:p>
-            <a:pPr lvl="1"/>
-            <a:r>
-              <a:rPr lang="en-US" dirty="0"/>
-              <a:t>📊 Real-time KPI metrics</a:t>
-            </a:r>
-          </a:p>
-          <a:p>
-            <a:pPr lvl="1"/>
-            <a:r>
-              <a:rPr lang="en-US" dirty="0"/>
-              <a:t>📈 Statistical validation charts</a:t>
-            </a:r>
-          </a:p>
-          <a:p>
-            <a:pPr lvl="1"/>
-            <a:r>
-              <a:rPr lang="en-US" dirty="0"/>
-              <a:t>📥 Export functionality (CSV, </a:t>
-            </a:r>
-            <a:r>
-              <a:rPr lang="en-US" dirty="0" err="1"/>
-              <a:t>GeoJSON</a:t>
-            </a:r>
-            <a:r>
-              <a:rPr lang="en-US" dirty="0"/>
-              <a:t>)</a:t>
-            </a:r>
-          </a:p>
-          <a:p>
-            <a:r>
-              <a:rPr lang="en-US" b="1" dirty="0"/>
-              <a:t>Architecture:</a:t>
-            </a:r>
-            <a:endParaRPr lang="en-US" dirty="0"/>
-          </a:p>
-          <a:p>
-            <a:pPr lvl="1"/>
-            <a:r>
-              <a:rPr lang="en-US" dirty="0"/>
-              <a:t>Modular design (easy to extend)</a:t>
-            </a:r>
-          </a:p>
-          <a:p>
-            <a:pPr lvl="1"/>
-            <a:r>
-              <a:rPr lang="en-US" dirty="0" err="1"/>
-              <a:t>Streamlit</a:t>
-            </a:r>
-            <a:r>
-              <a:rPr lang="en-US" dirty="0"/>
-              <a:t> framework</a:t>
-            </a:r>
-          </a:p>
-          <a:p>
-            <a:pPr lvl="1"/>
-            <a:r>
-              <a:rPr lang="en-US" dirty="0"/>
-              <a:t>Responsive layout</a:t>
-            </a:r>
-          </a:p>
-          <a:p>
-            <a:endParaRPr lang="en-US" dirty="0"/>
-          </a:p>
-        </p:txBody>
-      </p:sp>
-      <p:sp>
-        <p:nvSpPr>
-          <p:cNvPr id="4" name="Slide Number Placeholder 3">
-            <a:extLst>
-              <a:ext uri="{FF2B5EF4-FFF2-40B4-BE49-F238E27FC236}">
-                <a16:creationId xmlns:a16="http://schemas.microsoft.com/office/drawing/2014/main" id="{83B4259A-DF96-E0D1-EE06-D38A164870EF}"/>
-              </a:ext>
-            </a:extLst>
-          </p:cNvPr>
-          <p:cNvSpPr>
-            <a:spLocks noGrp="1"/>
-          </p:cNvSpPr>
-          <p:nvPr>
-            <p:ph type="sldNum" sz="quarter" idx="12"/>
-          </p:nvPr>
-        </p:nvSpPr>
-        <p:spPr/>
-        <p:txBody>
-          <a:bodyPr/>
-          <a:lstStyle/>
-          <a:p>
-            <a:fld id="{15ACE215-56CB-44C9-AFFD-7788C360CC10}" type="slidenum">
-              <a:rPr lang="en-US" smtClean="0"/>
-              <a:t>17</a:t>
-            </a:fld>
-            <a:endParaRPr lang="en-US"/>
-          </a:p>
-        </p:txBody>
-      </p:sp>
-    </p:spTree>
-    <p:extLst>
-      <p:ext uri="{BB962C8B-B14F-4D97-AF65-F5344CB8AC3E}">
-        <p14:creationId xmlns:p14="http://schemas.microsoft.com/office/powerpoint/2010/main" val="1551863004"/>
-      </p:ext>
-    </p:extLst>
-  </p:cSld>
-  <p:clrMapOvr>
-    <a:masterClrMapping/>
-  </p:clrMapOvr>
-</p:sld>
-</file>
-
 <file path=ppt/slides/slide18.xml><?xml version="1.0" encoding="utf-8"?>
 <p:sld xmlns:a="http://schemas.openxmlformats.org/drawingml/2006/main" xmlns:r="http://schemas.openxmlformats.org/officeDocument/2006/relationships" xmlns:p="http://schemas.openxmlformats.org/presentationml/2006/main">
   <p:cSld>
@@ -6485,7 +6490,7 @@
           <p:cNvPr id="2" name="Title 1">
             <a:extLst>
               <a:ext uri="{FF2B5EF4-FFF2-40B4-BE49-F238E27FC236}">
-                <a16:creationId xmlns:a16="http://schemas.microsoft.com/office/drawing/2014/main" id="{28DF60AF-9EC8-F2DF-9141-A1F36BDDE219}"/>
+                <a16:creationId xmlns:a16="http://schemas.microsoft.com/office/drawing/2014/main" id="{8D3F35A1-BF27-66EF-18E7-87CF933DCBED}"/>
               </a:ext>
             </a:extLst>
           </p:cNvPr>
@@ -6503,7 +6508,7 @@
           <a:p>
             <a:r>
               <a:rPr lang="en-US" dirty="0"/>
-              <a:t>Project Evolution - Challenges</a:t>
+              <a:t>Open Source Contribution</a:t>
             </a:r>
           </a:p>
         </p:txBody>
@@ -6513,7 +6518,7 @@
           <p:cNvPr id="3" name="Content Placeholder 2">
             <a:extLst>
               <a:ext uri="{FF2B5EF4-FFF2-40B4-BE49-F238E27FC236}">
-                <a16:creationId xmlns:a16="http://schemas.microsoft.com/office/drawing/2014/main" id="{16A878DE-AEEA-86AC-64A9-27063045D430}"/>
+                <a16:creationId xmlns:a16="http://schemas.microsoft.com/office/drawing/2014/main" id="{EAF4B4F0-A9D6-823A-09FE-72C14A07BA31}"/>
               </a:ext>
             </a:extLst>
           </p:cNvPr>
@@ -6527,106 +6532,117 @@
         <p:spPr/>
         <p:txBody>
           <a:bodyPr>
-            <a:normAutofit/>
+            <a:normAutofit fontScale="85000" lnSpcReduction="20000"/>
           </a:bodyPr>
           <a:lstStyle/>
           <a:p>
+            <a:pPr marL="0" indent="0">
+              <a:buNone/>
+            </a:pPr>
             <a:r>
               <a:rPr lang="en-US" b="1" dirty="0"/>
-              <a:t>Challenge 1:</a:t>
-            </a:r>
-            <a:r>
-              <a:rPr lang="en-US" dirty="0"/>
-              <a:t> Coordinate Precision</a:t>
+              <a:t>Repository Structure:</a:t>
+            </a:r>
+          </a:p>
+          <a:p>
+            <a:pPr marL="0" indent="0">
+              <a:buNone/>
+            </a:pPr>
+            <a:r>
+              <a:rPr lang="en-US" dirty="0"/>
+              <a:t>├── 1_datasets/          (Data documentation)</a:t>
+            </a:r>
+          </a:p>
+          <a:p>
+            <a:pPr marL="0" indent="0">
+              <a:buNone/>
+            </a:pPr>
+            <a:r>
+              <a:rPr lang="en-US" dirty="0"/>
+              <a:t>├── 2_data_preparation/  (ETL scripts)</a:t>
+            </a:r>
+          </a:p>
+          <a:p>
+            <a:pPr marL="0" indent="0">
+              <a:buNone/>
+            </a:pPr>
+            <a:r>
+              <a:rPr lang="en-US" dirty="0"/>
+              <a:t>├── 3_data_exploration/  (EDA notebooks)</a:t>
+            </a:r>
+          </a:p>
+          <a:p>
+            <a:pPr marL="0" indent="0">
+              <a:buNone/>
+            </a:pPr>
+            <a:r>
+              <a:rPr lang="en-US" dirty="0"/>
+              <a:t>├── 4_data_analysis/     (Geospatial + ML)</a:t>
+            </a:r>
+          </a:p>
+          <a:p>
+            <a:pPr marL="0" indent="0">
+              <a:buNone/>
+            </a:pPr>
+            <a:r>
+              <a:rPr lang="en-US" dirty="0"/>
+              <a:t>└── 5_dashboard/         (</a:t>
+            </a:r>
+            <a:r>
+              <a:rPr lang="en-US" dirty="0" err="1"/>
+              <a:t>Streamlit</a:t>
+            </a:r>
+            <a:r>
+              <a:rPr lang="en-US" dirty="0"/>
+              <a:t> app)</a:t>
+            </a:r>
+          </a:p>
+          <a:p>
+            <a:r>
+              <a:rPr lang="en-US" b="1" dirty="0"/>
+              <a:t>Reproducibility:</a:t>
             </a:r>
           </a:p>
           <a:p>
             <a:pPr lvl="1"/>
             <a:r>
+              <a:rPr lang="en-US" dirty="0"/>
+              <a:t>Full documentation</a:t>
+            </a:r>
+          </a:p>
+          <a:p>
+            <a:pPr lvl="1"/>
+            <a:r>
+              <a:rPr lang="en-US" dirty="0"/>
+              <a:t>Requirements.txt</a:t>
+            </a:r>
+          </a:p>
+          <a:p>
+            <a:pPr lvl="1"/>
+            <a:r>
+              <a:rPr lang="en-US" dirty="0"/>
+              <a:t>MIT License</a:t>
+            </a:r>
+          </a:p>
+          <a:p>
+            <a:pPr lvl="1"/>
+            <a:r>
+              <a:rPr lang="en-US" dirty="0"/>
+              <a:t>CI/CD pipeline (GitHub Actions)</a:t>
+            </a:r>
+          </a:p>
+          <a:p>
+            <a:pPr algn="just"/>
+            <a:r>
               <a:rPr lang="en-US" b="1" dirty="0"/>
-              <a:t>Problem:</a:t>
-            </a:r>
-            <a:r>
-              <a:rPr lang="en-US" dirty="0"/>
-              <a:t> 72% localities lacked exact coordinates</a:t>
-            </a:r>
-          </a:p>
-          <a:p>
-            <a:pPr lvl="1"/>
-            <a:r>
-              <a:rPr lang="en-US" b="1" dirty="0"/>
-              <a:t>Solution:</a:t>
-            </a:r>
-            <a:r>
-              <a:rPr lang="en-US" dirty="0"/>
-              <a:t> Manual verification + state-level fallbacks</a:t>
-            </a:r>
-          </a:p>
-          <a:p>
-            <a:r>
-              <a:rPr lang="en-US" b="1" dirty="0"/>
-              <a:t>Challenge 2:</a:t>
-            </a:r>
-            <a:r>
-              <a:rPr lang="en-US" dirty="0"/>
-              <a:t> Arabic Translation</a:t>
-            </a:r>
-          </a:p>
-          <a:p>
-            <a:pPr lvl="1"/>
-            <a:r>
-              <a:rPr lang="en-US" b="1" dirty="0"/>
-              <a:t>Problem:</a:t>
-            </a:r>
-            <a:r>
-              <a:rPr lang="en-US" dirty="0"/>
-              <a:t> 850+ facility names in Arabic</a:t>
-            </a:r>
-          </a:p>
-          <a:p>
-            <a:pPr lvl="1"/>
-            <a:r>
-              <a:rPr lang="en-US" b="1" dirty="0"/>
-              <a:t>Solution:</a:t>
-            </a:r>
-            <a:r>
-              <a:rPr lang="en-US" dirty="0"/>
-              <a:t> deep-translator integration (batch processing)</a:t>
-            </a:r>
-          </a:p>
-          <a:p>
-            <a:r>
-              <a:rPr lang="en-US" b="1" dirty="0"/>
-              <a:t>Challenge 3:</a:t>
-            </a:r>
-            <a:r>
-              <a:rPr lang="en-US" dirty="0"/>
-              <a:t> Statistical Validation</a:t>
-            </a:r>
-          </a:p>
-          <a:p>
-            <a:pPr lvl="1"/>
-            <a:r>
-              <a:rPr lang="en-US" b="1" dirty="0"/>
-              <a:t>Problem:</a:t>
-            </a:r>
-            <a:r>
-              <a:rPr lang="en-US" dirty="0"/>
-              <a:t> No ground truth for "vulnerability"</a:t>
-            </a:r>
-          </a:p>
-          <a:p>
-            <a:pPr lvl="1"/>
-            <a:r>
-              <a:rPr lang="en-US" b="1" dirty="0"/>
-              <a:t>Solution:</a:t>
-            </a:r>
-            <a:r>
-              <a:rPr lang="en-US" dirty="0"/>
-              <a:t> ML cross-validation + spatial autocorrelation</a:t>
-            </a:r>
-          </a:p>
-          <a:p>
+              <a:t>Access: </a:t>
+            </a:r>
+            <a:r>
+              <a:rPr lang="en-US" dirty="0">
+                <a:hlinkClick r:id="rId2"/>
+              </a:rPr>
+              <a:t>GitHub Repository Link</a:t>
+            </a:r>
             <a:endParaRPr lang="en-US" dirty="0"/>
           </a:p>
         </p:txBody>
@@ -6636,7 +6652,7 @@
           <p:cNvPr id="4" name="Slide Number Placeholder 3">
             <a:extLst>
               <a:ext uri="{FF2B5EF4-FFF2-40B4-BE49-F238E27FC236}">
-                <a16:creationId xmlns:a16="http://schemas.microsoft.com/office/drawing/2014/main" id="{655A9218-01FA-A278-01FB-D6CFBB08B133}"/>
+                <a16:creationId xmlns:a16="http://schemas.microsoft.com/office/drawing/2014/main" id="{3B48F233-FBD4-4844-0CE2-CAA38C71F607}"/>
               </a:ext>
             </a:extLst>
           </p:cNvPr>
@@ -6663,7 +6679,7 @@
     </p:spTree>
     <p:extLst>
       <p:ext uri="{BB962C8B-B14F-4D97-AF65-F5344CB8AC3E}">
-        <p14:creationId xmlns:p14="http://schemas.microsoft.com/office/powerpoint/2010/main" val="1077429114"/>
+        <p14:creationId xmlns:p14="http://schemas.microsoft.com/office/powerpoint/2010/main" val="3279843890"/>
       </p:ext>
     </p:extLst>
   </p:cSld>
@@ -6895,7 +6911,7 @@
           <p:cNvPr id="2" name="Title 1">
             <a:extLst>
               <a:ext uri="{FF2B5EF4-FFF2-40B4-BE49-F238E27FC236}">
-                <a16:creationId xmlns:a16="http://schemas.microsoft.com/office/drawing/2014/main" id="{3DFBD256-747D-008A-773F-AC618CDDE2FE}"/>
+                <a16:creationId xmlns:a16="http://schemas.microsoft.com/office/drawing/2014/main" id="{28DF60AF-9EC8-F2DF-9141-A1F36BDDE219}"/>
               </a:ext>
             </a:extLst>
           </p:cNvPr>
@@ -6913,7 +6929,7 @@
           <a:p>
             <a:r>
               <a:rPr lang="en-US" dirty="0"/>
-              <a:t>Limitations &amp; Future Work</a:t>
+              <a:t>Project Evolution - Challenges</a:t>
             </a:r>
           </a:p>
         </p:txBody>
@@ -6923,7 +6939,7 @@
           <p:cNvPr id="3" name="Content Placeholder 2">
             <a:extLst>
               <a:ext uri="{FF2B5EF4-FFF2-40B4-BE49-F238E27FC236}">
-                <a16:creationId xmlns:a16="http://schemas.microsoft.com/office/drawing/2014/main" id="{1F6C7EEB-C064-6319-10B1-780A86B6BA87}"/>
+                <a16:creationId xmlns:a16="http://schemas.microsoft.com/office/drawing/2014/main" id="{16A878DE-AEEA-86AC-64A9-27063045D430}"/>
               </a:ext>
             </a:extLst>
           </p:cNvPr>
@@ -6937,97 +6953,108 @@
         <p:spPr/>
         <p:txBody>
           <a:bodyPr>
-            <a:normAutofit lnSpcReduction="10000"/>
+            <a:normAutofit/>
           </a:bodyPr>
           <a:lstStyle/>
           <a:p>
             <a:r>
               <a:rPr lang="en-US" b="1" dirty="0"/>
-              <a:t>Current Limitations:</a:t>
-            </a:r>
+              <a:t>Challenge 1:</a:t>
+            </a:r>
+            <a:r>
+              <a:rPr lang="en-US" dirty="0"/>
+              <a:t> Coordinate Precision</a:t>
+            </a:r>
+          </a:p>
+          <a:p>
+            <a:pPr lvl="1"/>
+            <a:r>
+              <a:rPr lang="en-US" b="1" dirty="0"/>
+              <a:t>Problem:</a:t>
+            </a:r>
+            <a:r>
+              <a:rPr lang="en-US" dirty="0"/>
+              <a:t> 72% localities lacked exact coordinates</a:t>
+            </a:r>
+          </a:p>
+          <a:p>
+            <a:pPr lvl="1"/>
+            <a:r>
+              <a:rPr lang="en-US" b="1" dirty="0"/>
+              <a:t>Solution:</a:t>
+            </a:r>
+            <a:r>
+              <a:rPr lang="en-US" dirty="0"/>
+              <a:t> Manual verification + state-level fallbacks</a:t>
+            </a:r>
+          </a:p>
+          <a:p>
+            <a:r>
+              <a:rPr lang="en-US" b="1" dirty="0"/>
+              <a:t>Challenge 2:</a:t>
+            </a:r>
+            <a:r>
+              <a:rPr lang="en-US" dirty="0"/>
+              <a:t> Arabic Translation</a:t>
+            </a:r>
+          </a:p>
+          <a:p>
+            <a:pPr lvl="1"/>
+            <a:r>
+              <a:rPr lang="en-US" b="1" dirty="0"/>
+              <a:t>Problem:</a:t>
+            </a:r>
+            <a:r>
+              <a:rPr lang="en-US" dirty="0"/>
+              <a:t> 850+ facility names in Arabic</a:t>
+            </a:r>
+          </a:p>
+          <a:p>
+            <a:pPr lvl="1"/>
+            <a:r>
+              <a:rPr lang="en-US" b="1" dirty="0"/>
+              <a:t>Solution:</a:t>
+            </a:r>
+            <a:r>
+              <a:rPr lang="en-US" dirty="0"/>
+              <a:t> deep-translator integration (batch processing)</a:t>
+            </a:r>
+          </a:p>
+          <a:p>
+            <a:r>
+              <a:rPr lang="en-US" b="1" dirty="0"/>
+              <a:t>Challenge 3:</a:t>
+            </a:r>
+            <a:r>
+              <a:rPr lang="en-US" dirty="0"/>
+              <a:t> Statistical Validation</a:t>
+            </a:r>
+          </a:p>
+          <a:p>
+            <a:pPr lvl="1"/>
+            <a:r>
+              <a:rPr lang="en-US" b="1" dirty="0"/>
+              <a:t>Problem:</a:t>
+            </a:r>
+            <a:r>
+              <a:rPr lang="en-US" dirty="0"/>
+              <a:t> No ground truth for "vulnerability"</a:t>
+            </a:r>
+          </a:p>
+          <a:p>
+            <a:pPr lvl="1"/>
+            <a:r>
+              <a:rPr lang="en-US" b="1" dirty="0"/>
+              <a:t>Solution:</a:t>
+            </a:r>
+            <a:r>
+              <a:rPr lang="en-US" dirty="0"/>
+              <a:t> ML cross-validation + spatial autocorrelation</a:t>
+            </a:r>
+          </a:p>
+          <a:p>
             <a:endParaRPr lang="en-US" dirty="0"/>
           </a:p>
-          <a:p>
-            <a:pPr lvl="1"/>
-            <a:r>
-              <a:rPr lang="en-US" dirty="0"/>
-              <a:t>Single time-point analysis (April 2024)</a:t>
-            </a:r>
-          </a:p>
-          <a:p>
-            <a:pPr lvl="1"/>
-            <a:r>
-              <a:rPr lang="en-US" dirty="0"/>
-              <a:t>Assumes operational facilities</a:t>
-            </a:r>
-          </a:p>
-          <a:p>
-            <a:pPr lvl="1"/>
-            <a:r>
-              <a:rPr lang="en-US" dirty="0"/>
-              <a:t>Euclidean distance (not road networks)</a:t>
-            </a:r>
-          </a:p>
-          <a:p>
-            <a:pPr lvl="1"/>
-            <a:r>
-              <a:rPr lang="en-US" dirty="0"/>
-              <a:t>~70% approximate coordinates</a:t>
-            </a:r>
-          </a:p>
-          <a:p>
-            <a:r>
-              <a:rPr lang="en-US" b="1" dirty="0"/>
-              <a:t>Future Enhancements:</a:t>
-            </a:r>
-            <a:endParaRPr lang="en-US" dirty="0"/>
-          </a:p>
-          <a:p>
-            <a:pPr lvl="1"/>
-            <a:r>
-              <a:rPr lang="en-US" dirty="0"/>
-              <a:t>Real-time API integration (live IDP data)</a:t>
-            </a:r>
-          </a:p>
-          <a:p>
-            <a:pPr lvl="1"/>
-            <a:r>
-              <a:rPr lang="en-US" dirty="0"/>
-              <a:t>Time-series displacement tracking</a:t>
-            </a:r>
-          </a:p>
-          <a:p>
-            <a:pPr lvl="1"/>
-            <a:r>
-              <a:rPr lang="en-US" dirty="0"/>
-              <a:t>Road network analysis (OSM)</a:t>
-            </a:r>
-          </a:p>
-          <a:p>
-            <a:pPr lvl="1"/>
-            <a:r>
-              <a:rPr lang="en-US" dirty="0"/>
-              <a:t>NLP rumor tracking module</a:t>
-            </a:r>
-          </a:p>
-          <a:p>
-            <a:pPr lvl="1"/>
-            <a:r>
-              <a:rPr lang="en-US" dirty="0"/>
-              <a:t>Facility capacity data (</a:t>
-            </a:r>
-            <a:r>
-              <a:rPr lang="en-US" dirty="0" err="1"/>
-              <a:t>HeRAMS</a:t>
-            </a:r>
-            <a:r>
-              <a:rPr lang="en-US" dirty="0"/>
-              <a:t>)</a:t>
-            </a:r>
-          </a:p>
-          <a:p>
-            <a:endParaRPr lang="en-US" dirty="0"/>
-          </a:p>
         </p:txBody>
       </p:sp>
       <p:sp>
@@ -7035,7 +7062,7 @@
           <p:cNvPr id="4" name="Slide Number Placeholder 3">
             <a:extLst>
               <a:ext uri="{FF2B5EF4-FFF2-40B4-BE49-F238E27FC236}">
-                <a16:creationId xmlns:a16="http://schemas.microsoft.com/office/drawing/2014/main" id="{FD7A314F-A8BA-0DBB-CD2D-FFE72F852E9D}"/>
+                <a16:creationId xmlns:a16="http://schemas.microsoft.com/office/drawing/2014/main" id="{655A9218-01FA-A278-01FB-D6CFBB08B133}"/>
               </a:ext>
             </a:extLst>
           </p:cNvPr>
@@ -7062,7 +7089,7 @@
     </p:spTree>
     <p:extLst>
       <p:ext uri="{BB962C8B-B14F-4D97-AF65-F5344CB8AC3E}">
-        <p14:creationId xmlns:p14="http://schemas.microsoft.com/office/powerpoint/2010/main" val="3155125309"/>
+        <p14:creationId xmlns:p14="http://schemas.microsoft.com/office/powerpoint/2010/main" val="1077429114"/>
       </p:ext>
     </p:extLst>
   </p:cSld>
@@ -7094,7 +7121,7 @@
           <p:cNvPr id="2" name="Title 1">
             <a:extLst>
               <a:ext uri="{FF2B5EF4-FFF2-40B4-BE49-F238E27FC236}">
-                <a16:creationId xmlns:a16="http://schemas.microsoft.com/office/drawing/2014/main" id="{AFC81E9B-0AE0-4F48-CCA9-3884F5AB0645}"/>
+                <a16:creationId xmlns:a16="http://schemas.microsoft.com/office/drawing/2014/main" id="{3DFBD256-747D-008A-773F-AC618CDDE2FE}"/>
               </a:ext>
             </a:extLst>
           </p:cNvPr>
@@ -7112,7 +7139,7 @@
           <a:p>
             <a:r>
               <a:rPr lang="en-US" dirty="0"/>
-              <a:t>Impact &amp; Recommendations</a:t>
+              <a:t>Limitations &amp; Future Work</a:t>
             </a:r>
           </a:p>
         </p:txBody>
@@ -7122,7 +7149,7 @@
           <p:cNvPr id="3" name="Content Placeholder 2">
             <a:extLst>
               <a:ext uri="{FF2B5EF4-FFF2-40B4-BE49-F238E27FC236}">
-                <a16:creationId xmlns:a16="http://schemas.microsoft.com/office/drawing/2014/main" id="{B960590E-6EE9-DC9D-F8AB-7C44153333D7}"/>
+                <a16:creationId xmlns:a16="http://schemas.microsoft.com/office/drawing/2014/main" id="{1F6C7EEB-C064-6319-10B1-780A86B6BA87}"/>
               </a:ext>
             </a:extLst>
           </p:cNvPr>
@@ -7136,13 +7163,13 @@
         <p:spPr/>
         <p:txBody>
           <a:bodyPr>
-            <a:normAutofit/>
+            <a:normAutofit lnSpcReduction="10000"/>
           </a:bodyPr>
           <a:lstStyle/>
           <a:p>
             <a:r>
               <a:rPr lang="en-US" b="1" dirty="0"/>
-              <a:t>Immediate Actions:</a:t>
+              <a:t>Current Limitations:</a:t>
             </a:r>
             <a:endParaRPr lang="en-US" dirty="0"/>
           </a:p>
@@ -7150,27 +7177,34 @@
             <a:pPr lvl="1"/>
             <a:r>
               <a:rPr lang="en-US" dirty="0"/>
-              <a:t>Deploy mobile clinics to River Nile/Red Sea</a:t>
+              <a:t>Single time-point analysis (April 2024)</a:t>
             </a:r>
           </a:p>
           <a:p>
             <a:pPr lvl="1"/>
             <a:r>
               <a:rPr lang="en-US" dirty="0"/>
-              <a:t>Prioritize 156 localities beyond 20km</a:t>
+              <a:t>Assumes operational facilities</a:t>
             </a:r>
           </a:p>
           <a:p>
             <a:pPr lvl="1"/>
             <a:r>
               <a:rPr lang="en-US" dirty="0"/>
-              <a:t>Monitor Port Sudan IDP influx</a:t>
+              <a:t>Euclidean distance (not road networks)</a:t>
+            </a:r>
+          </a:p>
+          <a:p>
+            <a:pPr lvl="1"/>
+            <a:r>
+              <a:rPr lang="en-US" dirty="0"/>
+              <a:t>~70% approximate coordinates</a:t>
             </a:r>
           </a:p>
           <a:p>
             <a:r>
               <a:rPr lang="en-US" b="1" dirty="0"/>
-              <a:t>Strategic Recommendations:</a:t>
+              <a:t>Future Enhancements:</a:t>
             </a:r>
             <a:endParaRPr lang="en-US" dirty="0"/>
           </a:p>
@@ -7178,31 +7212,43 @@
             <a:pPr lvl="1"/>
             <a:r>
               <a:rPr lang="en-US" dirty="0"/>
-              <a:t>Shift from reactive → anticipatory response</a:t>
+              <a:t>Real-time API integration (live IDP data)</a:t>
             </a:r>
           </a:p>
           <a:p>
             <a:pPr lvl="1"/>
             <a:r>
               <a:rPr lang="en-US" dirty="0"/>
-              <a:t>Integrate geospatial analysis into planning</a:t>
+              <a:t>Time-series displacement tracking</a:t>
             </a:r>
           </a:p>
           <a:p>
             <a:pPr lvl="1"/>
             <a:r>
               <a:rPr lang="en-US" dirty="0"/>
-              <a:t>Establish real-time monitoring systems</a:t>
-            </a:r>
-          </a:p>
-          <a:p>
-            <a:r>
-              <a:rPr lang="en-US" b="1" dirty="0"/>
-              <a:t>Policy:</a:t>
-            </a:r>
-            <a:r>
-              <a:rPr lang="en-US" dirty="0"/>
-              <a:t> Non-Darfur regions require urgent focus</a:t>
+              <a:t>Road network analysis (OSM)</a:t>
+            </a:r>
+          </a:p>
+          <a:p>
+            <a:pPr lvl="1"/>
+            <a:r>
+              <a:rPr lang="en-US" dirty="0"/>
+              <a:t>NLP rumor tracking module</a:t>
+            </a:r>
+          </a:p>
+          <a:p>
+            <a:pPr lvl="1"/>
+            <a:r>
+              <a:rPr lang="en-US" dirty="0"/>
+              <a:t>Facility capacity data (</a:t>
+            </a:r>
+            <a:r>
+              <a:rPr lang="en-US" dirty="0" err="1"/>
+              <a:t>HeRAMS</a:t>
+            </a:r>
+            <a:r>
+              <a:rPr lang="en-US" dirty="0"/>
+              <a:t>)</a:t>
             </a:r>
           </a:p>
           <a:p>
@@ -7215,7 +7261,7 @@
           <p:cNvPr id="4" name="Slide Number Placeholder 3">
             <a:extLst>
               <a:ext uri="{FF2B5EF4-FFF2-40B4-BE49-F238E27FC236}">
-                <a16:creationId xmlns:a16="http://schemas.microsoft.com/office/drawing/2014/main" id="{0E1D7092-9BD2-23D2-9FE2-19C9EF3AA2C9}"/>
+                <a16:creationId xmlns:a16="http://schemas.microsoft.com/office/drawing/2014/main" id="{FD7A314F-A8BA-0DBB-CD2D-FFE72F852E9D}"/>
               </a:ext>
             </a:extLst>
           </p:cNvPr>
@@ -7242,7 +7288,7 @@
     </p:spTree>
     <p:extLst>
       <p:ext uri="{BB962C8B-B14F-4D97-AF65-F5344CB8AC3E}">
-        <p14:creationId xmlns:p14="http://schemas.microsoft.com/office/powerpoint/2010/main" val="459570705"/>
+        <p14:creationId xmlns:p14="http://schemas.microsoft.com/office/powerpoint/2010/main" val="3155125309"/>
       </p:ext>
     </p:extLst>
   </p:cSld>
@@ -7274,7 +7320,7 @@
           <p:cNvPr id="2" name="Title 1">
             <a:extLst>
               <a:ext uri="{FF2B5EF4-FFF2-40B4-BE49-F238E27FC236}">
-                <a16:creationId xmlns:a16="http://schemas.microsoft.com/office/drawing/2014/main" id="{FEDE3DA6-8C29-80F0-298E-47B037FB7789}"/>
+                <a16:creationId xmlns:a16="http://schemas.microsoft.com/office/drawing/2014/main" id="{AFC81E9B-0AE0-4F48-CCA9-3884F5AB0645}"/>
               </a:ext>
             </a:extLst>
           </p:cNvPr>
@@ -7292,7 +7338,7 @@
           <a:p>
             <a:r>
               <a:rPr lang="en-US" dirty="0"/>
-              <a:t>Skills Developed</a:t>
+              <a:t>Impact &amp; Recommendations</a:t>
             </a:r>
           </a:p>
         </p:txBody>
@@ -7302,7 +7348,7 @@
           <p:cNvPr id="3" name="Content Placeholder 2">
             <a:extLst>
               <a:ext uri="{FF2B5EF4-FFF2-40B4-BE49-F238E27FC236}">
-                <a16:creationId xmlns:a16="http://schemas.microsoft.com/office/drawing/2014/main" id="{4F89979A-5714-6523-3516-03FED6FE79A9}"/>
+                <a16:creationId xmlns:a16="http://schemas.microsoft.com/office/drawing/2014/main" id="{B960590E-6EE9-DC9D-F8AB-7C44153333D7}"/>
               </a:ext>
             </a:extLst>
           </p:cNvPr>
@@ -7322,7 +7368,7 @@
           <a:p>
             <a:r>
               <a:rPr lang="en-US" b="1" dirty="0"/>
-              <a:t>Technical Skills:</a:t>
+              <a:t>Immediate Actions:</a:t>
             </a:r>
             <a:endParaRPr lang="en-US" dirty="0"/>
           </a:p>
@@ -7330,94 +7376,64 @@
             <a:pPr lvl="1"/>
             <a:r>
               <a:rPr lang="en-US" dirty="0"/>
-              <a:t>Advanced geospatial analysis (</a:t>
-            </a:r>
-            <a:r>
-              <a:rPr lang="en-US" dirty="0" err="1"/>
-              <a:t>GeoPandas</a:t>
-            </a:r>
-            <a:r>
-              <a:rPr lang="en-US" dirty="0"/>
-              <a:t>, spatial stats)</a:t>
+              <a:t>Deploy mobile clinics to River Nile/Red Sea</a:t>
             </a:r>
           </a:p>
           <a:p>
             <a:pPr lvl="1"/>
             <a:r>
               <a:rPr lang="en-US" dirty="0"/>
-              <a:t>Machine learning validation (Scikit-learn, </a:t>
-            </a:r>
-            <a:r>
-              <a:rPr lang="en-US" dirty="0" err="1"/>
-              <a:t>PySAL</a:t>
-            </a:r>
-            <a:r>
-              <a:rPr lang="en-US" dirty="0"/>
-              <a:t>)</a:t>
+              <a:t>Prioritize 156 localities beyond 20km</a:t>
             </a:r>
           </a:p>
           <a:p>
             <a:pPr lvl="1"/>
             <a:r>
               <a:rPr lang="en-US" dirty="0"/>
-              <a:t>Data visualization (Folium, Plotly, </a:t>
-            </a:r>
-            <a:r>
-              <a:rPr lang="en-US" dirty="0" err="1"/>
-              <a:t>Streamlit</a:t>
-            </a:r>
-            <a:r>
-              <a:rPr lang="en-US" dirty="0"/>
-              <a:t>)</a:t>
-            </a:r>
+              <a:t>Monitor Port Sudan IDP influx</a:t>
+            </a:r>
+          </a:p>
+          <a:p>
+            <a:r>
+              <a:rPr lang="en-US" b="1" dirty="0"/>
+              <a:t>Strategic Recommendations:</a:t>
+            </a:r>
+            <a:endParaRPr lang="en-US" dirty="0"/>
           </a:p>
           <a:p>
             <a:pPr lvl="1"/>
             <a:r>
               <a:rPr lang="en-US" dirty="0"/>
-              <a:t>ETL pipeline development</a:t>
+              <a:t>Shift from reactive → anticipatory response</a:t>
             </a:r>
           </a:p>
           <a:p>
             <a:pPr lvl="1"/>
             <a:r>
               <a:rPr lang="en-US" dirty="0"/>
-              <a:t>Statistical hypothesis testing</a:t>
+              <a:t>Integrate geospatial analysis into planning</a:t>
+            </a:r>
+          </a:p>
+          <a:p>
+            <a:pPr lvl="1"/>
+            <a:r>
+              <a:rPr lang="en-US" dirty="0"/>
+              <a:t>Establish real-time monitoring systems</a:t>
             </a:r>
           </a:p>
           <a:p>
             <a:r>
               <a:rPr lang="en-US" b="1" dirty="0"/>
-              <a:t>Soft Skills:</a:t>
-            </a:r>
+              <a:t>Policy:</a:t>
+            </a:r>
+            <a:r>
+              <a:rPr lang="en-US" dirty="0"/>
+              <a:t> Non-Darfur regions require urgent focus</a:t>
+            </a:r>
+          </a:p>
+          <a:p>
             <a:endParaRPr lang="en-US" dirty="0"/>
           </a:p>
-          <a:p>
-            <a:pPr lvl="1"/>
-            <a:r>
-              <a:rPr lang="en-US" dirty="0"/>
-              <a:t>Complex problem framing</a:t>
-            </a:r>
-          </a:p>
-          <a:p>
-            <a:pPr lvl="1"/>
-            <a:r>
-              <a:rPr lang="en-US" dirty="0"/>
-              <a:t>Stakeholder communication</a:t>
-            </a:r>
-          </a:p>
-          <a:p>
-            <a:pPr lvl="1"/>
-            <a:r>
-              <a:rPr lang="en-US" dirty="0"/>
-              <a:t>Ethical </a:t>
-            </a:r>
-            <a:r>
-              <a:rPr lang="en-US"/>
-              <a:t>data governance</a:t>
-            </a:r>
-            <a:endParaRPr lang="en-US" dirty="0"/>
-          </a:p>
         </p:txBody>
       </p:sp>
       <p:sp>
@@ -7425,7 +7441,7 @@
           <p:cNvPr id="4" name="Slide Number Placeholder 3">
             <a:extLst>
               <a:ext uri="{FF2B5EF4-FFF2-40B4-BE49-F238E27FC236}">
-                <a16:creationId xmlns:a16="http://schemas.microsoft.com/office/drawing/2014/main" id="{FC627F5A-A4B2-1778-B0D7-41C0BC0EB47E}"/>
+                <a16:creationId xmlns:a16="http://schemas.microsoft.com/office/drawing/2014/main" id="{0E1D7092-9BD2-23D2-9FE2-19C9EF3AA2C9}"/>
               </a:ext>
             </a:extLst>
           </p:cNvPr>
@@ -7452,7 +7468,7 @@
     </p:spTree>
     <p:extLst>
       <p:ext uri="{BB962C8B-B14F-4D97-AF65-F5344CB8AC3E}">
-        <p14:creationId xmlns:p14="http://schemas.microsoft.com/office/powerpoint/2010/main" val="241679575"/>
+        <p14:creationId xmlns:p14="http://schemas.microsoft.com/office/powerpoint/2010/main" val="459570705"/>
       </p:ext>
     </p:extLst>
   </p:cSld>
@@ -7484,7 +7500,7 @@
           <p:cNvPr id="2" name="Title 1">
             <a:extLst>
               <a:ext uri="{FF2B5EF4-FFF2-40B4-BE49-F238E27FC236}">
-                <a16:creationId xmlns:a16="http://schemas.microsoft.com/office/drawing/2014/main" id="{017D108F-2B1D-13F2-D6E6-A9398085784F}"/>
+                <a16:creationId xmlns:a16="http://schemas.microsoft.com/office/drawing/2014/main" id="{FEDE3DA6-8C29-80F0-298E-47B037FB7789}"/>
               </a:ext>
             </a:extLst>
           </p:cNvPr>
@@ -7502,7 +7518,7 @@
           <a:p>
             <a:r>
               <a:rPr lang="en-US" dirty="0"/>
-              <a:t>Lessons Learned</a:t>
+              <a:t>Skills Developed</a:t>
             </a:r>
           </a:p>
         </p:txBody>
@@ -7512,7 +7528,7 @@
           <p:cNvPr id="3" name="Content Placeholder 2">
             <a:extLst>
               <a:ext uri="{FF2B5EF4-FFF2-40B4-BE49-F238E27FC236}">
-                <a16:creationId xmlns:a16="http://schemas.microsoft.com/office/drawing/2014/main" id="{C594EA8B-31E2-7ED8-1FCA-8469C94BEA85}"/>
+                <a16:creationId xmlns:a16="http://schemas.microsoft.com/office/drawing/2014/main" id="{4F89979A-5714-6523-3516-03FED6FE79A9}"/>
               </a:ext>
             </a:extLst>
           </p:cNvPr>
@@ -7526,13 +7542,13 @@
         <p:spPr/>
         <p:txBody>
           <a:bodyPr>
-            <a:normAutofit fontScale="92500" lnSpcReduction="10000"/>
+            <a:normAutofit/>
           </a:bodyPr>
           <a:lstStyle/>
           <a:p>
             <a:r>
               <a:rPr lang="en-US" b="1" dirty="0"/>
-              <a:t>Data is Never Clean</a:t>
+              <a:t>Technical Skills:</a:t>
             </a:r>
             <a:endParaRPr lang="en-US" dirty="0"/>
           </a:p>
@@ -7540,27 +7556,65 @@
             <a:pPr lvl="1"/>
             <a:r>
               <a:rPr lang="en-US" dirty="0"/>
-              <a:t>Real humanitarian data requires creativity</a:t>
+              <a:t>Advanced geospatial analysis (</a:t>
+            </a:r>
+            <a:r>
+              <a:rPr lang="en-US" dirty="0" err="1"/>
+              <a:t>GeoPandas</a:t>
+            </a:r>
+            <a:r>
+              <a:rPr lang="en-US" dirty="0"/>
+              <a:t>, spatial stats)</a:t>
             </a:r>
           </a:p>
           <a:p>
             <a:pPr lvl="1"/>
             <a:r>
               <a:rPr lang="en-US" dirty="0"/>
-              <a:t>80% of time spent on data preparation</a:t>
+              <a:t>Machine learning validation (Scikit-learn, </a:t>
+            </a:r>
+            <a:r>
+              <a:rPr lang="en-US" dirty="0" err="1"/>
+              <a:t>PySAL</a:t>
+            </a:r>
+            <a:r>
+              <a:rPr lang="en-US" dirty="0"/>
+              <a:t>)</a:t>
             </a:r>
           </a:p>
           <a:p>
             <a:pPr lvl="1"/>
             <a:r>
               <a:rPr lang="en-US" dirty="0"/>
-              <a:t>Verification &gt; perfection</a:t>
+              <a:t>Data visualization (Folium, Plotly, </a:t>
+            </a:r>
+            <a:r>
+              <a:rPr lang="en-US" dirty="0" err="1"/>
+              <a:t>Streamlit</a:t>
+            </a:r>
+            <a:r>
+              <a:rPr lang="en-US" dirty="0"/>
+              <a:t>)</a:t>
+            </a:r>
+          </a:p>
+          <a:p>
+            <a:pPr lvl="1"/>
+            <a:r>
+              <a:rPr lang="en-US" dirty="0"/>
+              <a:t>ETL pipeline development</a:t>
+            </a:r>
+          </a:p>
+          <a:p>
+            <a:pPr lvl="1"/>
+            <a:r>
+              <a:rPr lang="en-US" dirty="0"/>
+              <a:t>Statistical hypothesis testing</a:t>
             </a:r>
           </a:p>
           <a:p>
             <a:r>
               <a:rPr lang="en-US" b="1" dirty="0"/>
-              <a:t>Methodology Matters</a:t>
+              <a:t>Soft Skills:</a:t>
             </a:r>
             <a:endParaRPr lang="en-US" dirty="0"/>
           </a:p>
@@ -7568,54 +7622,28 @@
             <a:pPr lvl="1"/>
             <a:r>
               <a:rPr lang="en-US" dirty="0"/>
-              <a:t>Statistical validation builds trust</a:t>
+              <a:t>Complex problem framing</a:t>
             </a:r>
           </a:p>
           <a:p>
             <a:pPr lvl="1"/>
             <a:r>
               <a:rPr lang="en-US" dirty="0"/>
-              <a:t>94.6% accuracy legitimizes findings</a:t>
+              <a:t>Stakeholder communication</a:t>
             </a:r>
           </a:p>
           <a:p>
             <a:pPr lvl="1"/>
             <a:r>
               <a:rPr lang="en-US" dirty="0"/>
-              <a:t>Transparency is essential</a:t>
-            </a:r>
-          </a:p>
-          <a:p>
-            <a:r>
-              <a:rPr lang="en-US" b="1" dirty="0"/>
-              <a:t>Communication is Key</a:t>
+              <a:t>Ethical </a:t>
+            </a:r>
+            <a:r>
+              <a:rPr lang="en-US"/>
+              <a:t>data governance</a:t>
             </a:r>
             <a:endParaRPr lang="en-US" dirty="0"/>
           </a:p>
-          <a:p>
-            <a:pPr lvl="1"/>
-            <a:r>
-              <a:rPr lang="en-US" dirty="0"/>
-              <a:t>Technical rigor ≠ impact without storytelling</a:t>
-            </a:r>
-          </a:p>
-          <a:p>
-            <a:pPr lvl="1"/>
-            <a:r>
-              <a:rPr lang="en-US" dirty="0"/>
-              <a:t>Dashboard makes analysis actionable</a:t>
-            </a:r>
-          </a:p>
-          <a:p>
-            <a:pPr lvl="1"/>
-            <a:r>
-              <a:rPr lang="en-US" dirty="0"/>
-              <a:t>Modular design enables evolution</a:t>
-            </a:r>
-          </a:p>
-          <a:p>
-            <a:endParaRPr lang="en-US" dirty="0"/>
-          </a:p>
         </p:txBody>
       </p:sp>
       <p:sp>
@@ -7623,7 +7651,7 @@
           <p:cNvPr id="4" name="Slide Number Placeholder 3">
             <a:extLst>
               <a:ext uri="{FF2B5EF4-FFF2-40B4-BE49-F238E27FC236}">
-                <a16:creationId xmlns:a16="http://schemas.microsoft.com/office/drawing/2014/main" id="{9345A9E1-2E53-7919-FE5B-15BE3EDC145C}"/>
+                <a16:creationId xmlns:a16="http://schemas.microsoft.com/office/drawing/2014/main" id="{FC627F5A-A4B2-1778-B0D7-41C0BC0EB47E}"/>
               </a:ext>
             </a:extLst>
           </p:cNvPr>
@@ -7650,7 +7678,7 @@
     </p:spTree>
     <p:extLst>
       <p:ext uri="{BB962C8B-B14F-4D97-AF65-F5344CB8AC3E}">
-        <p14:creationId xmlns:p14="http://schemas.microsoft.com/office/powerpoint/2010/main" val="4146011122"/>
+        <p14:creationId xmlns:p14="http://schemas.microsoft.com/office/powerpoint/2010/main" val="241679575"/>
       </p:ext>
     </p:extLst>
   </p:cSld>
@@ -7682,7 +7710,7 @@
           <p:cNvPr id="2" name="Title 1">
             <a:extLst>
               <a:ext uri="{FF2B5EF4-FFF2-40B4-BE49-F238E27FC236}">
-                <a16:creationId xmlns:a16="http://schemas.microsoft.com/office/drawing/2014/main" id="{8D3F35A1-BF27-66EF-18E7-87CF933DCBED}"/>
+                <a16:creationId xmlns:a16="http://schemas.microsoft.com/office/drawing/2014/main" id="{017D108F-2B1D-13F2-D6E6-A9398085784F}"/>
               </a:ext>
             </a:extLst>
           </p:cNvPr>
@@ -7700,7 +7728,7 @@
           <a:p>
             <a:r>
               <a:rPr lang="en-US" dirty="0"/>
-              <a:t>Open Source Contribution</a:t>
+              <a:t>Lessons Learned</a:t>
             </a:r>
           </a:p>
         </p:txBody>
@@ -7710,7 +7738,7 @@
           <p:cNvPr id="3" name="Content Placeholder 2">
             <a:extLst>
               <a:ext uri="{FF2B5EF4-FFF2-40B4-BE49-F238E27FC236}">
-                <a16:creationId xmlns:a16="http://schemas.microsoft.com/office/drawing/2014/main" id="{EAF4B4F0-A9D6-823A-09FE-72C14A07BA31}"/>
+                <a16:creationId xmlns:a16="http://schemas.microsoft.com/office/drawing/2014/main" id="{C594EA8B-31E2-7ED8-1FCA-8469C94BEA85}"/>
               </a:ext>
             </a:extLst>
           </p:cNvPr>
@@ -7724,117 +7752,94 @@
         <p:spPr/>
         <p:txBody>
           <a:bodyPr>
-            <a:normAutofit fontScale="85000" lnSpcReduction="20000"/>
+            <a:normAutofit fontScale="92500" lnSpcReduction="10000"/>
           </a:bodyPr>
           <a:lstStyle/>
           <a:p>
-            <a:pPr marL="0" indent="0">
-              <a:buNone/>
-            </a:pPr>
             <a:r>
               <a:rPr lang="en-US" b="1" dirty="0"/>
-              <a:t>Repository Structure:</a:t>
-            </a:r>
-          </a:p>
-          <a:p>
-            <a:pPr marL="0" indent="0">
-              <a:buNone/>
-            </a:pPr>
-            <a:r>
-              <a:rPr lang="en-US" dirty="0"/>
-              <a:t>├── 1_datasets/          (Data documentation)</a:t>
-            </a:r>
-          </a:p>
-          <a:p>
-            <a:pPr marL="0" indent="0">
-              <a:buNone/>
-            </a:pPr>
-            <a:r>
-              <a:rPr lang="en-US" dirty="0"/>
-              <a:t>├── 2_data_preparation/  (ETL scripts)</a:t>
-            </a:r>
-          </a:p>
-          <a:p>
-            <a:pPr marL="0" indent="0">
-              <a:buNone/>
-            </a:pPr>
-            <a:r>
-              <a:rPr lang="en-US" dirty="0"/>
-              <a:t>├── 3_data_exploration/  (EDA notebooks)</a:t>
-            </a:r>
-          </a:p>
-          <a:p>
-            <a:pPr marL="0" indent="0">
-              <a:buNone/>
-            </a:pPr>
-            <a:r>
-              <a:rPr lang="en-US" dirty="0"/>
-              <a:t>├── 4_data_analysis/     (Geospatial + ML)</a:t>
-            </a:r>
-          </a:p>
-          <a:p>
-            <a:pPr marL="0" indent="0">
-              <a:buNone/>
-            </a:pPr>
-            <a:r>
-              <a:rPr lang="en-US" dirty="0"/>
-              <a:t>└── 5_dashboard/         (</a:t>
-            </a:r>
-            <a:r>
-              <a:rPr lang="en-US" dirty="0" err="1"/>
-              <a:t>Streamlit</a:t>
-            </a:r>
-            <a:r>
-              <a:rPr lang="en-US" dirty="0"/>
-              <a:t> app)</a:t>
+              <a:t>Data is Never Clean</a:t>
+            </a:r>
+            <a:endParaRPr lang="en-US" dirty="0"/>
+          </a:p>
+          <a:p>
+            <a:pPr lvl="1"/>
+            <a:r>
+              <a:rPr lang="en-US" dirty="0"/>
+              <a:t>Real humanitarian data requires creativity</a:t>
+            </a:r>
+          </a:p>
+          <a:p>
+            <a:pPr lvl="1"/>
+            <a:r>
+              <a:rPr lang="en-US" dirty="0"/>
+              <a:t>80% of time spent on data preparation</a:t>
+            </a:r>
+          </a:p>
+          <a:p>
+            <a:pPr lvl="1"/>
+            <a:r>
+              <a:rPr lang="en-US" dirty="0"/>
+              <a:t>Verification &gt; perfection</a:t>
             </a:r>
           </a:p>
           <a:p>
             <a:r>
               <a:rPr lang="en-US" b="1" dirty="0"/>
-              <a:t>Reproducibility:</a:t>
-            </a:r>
+              <a:t>Methodology Matters</a:t>
+            </a:r>
+            <a:endParaRPr lang="en-US" dirty="0"/>
           </a:p>
           <a:p>
             <a:pPr lvl="1"/>
             <a:r>
               <a:rPr lang="en-US" dirty="0"/>
-              <a:t>Full documentation</a:t>
+              <a:t>Statistical validation builds trust</a:t>
             </a:r>
           </a:p>
           <a:p>
             <a:pPr lvl="1"/>
             <a:r>
               <a:rPr lang="en-US" dirty="0"/>
-              <a:t>Requirements.txt</a:t>
+              <a:t>94.6% accuracy legitimizes findings</a:t>
             </a:r>
           </a:p>
           <a:p>
             <a:pPr lvl="1"/>
             <a:r>
               <a:rPr lang="en-US" dirty="0"/>
-              <a:t>MIT License</a:t>
-            </a:r>
+              <a:t>Transparency is essential</a:t>
+            </a:r>
+          </a:p>
+          <a:p>
+            <a:r>
+              <a:rPr lang="en-US" b="1" dirty="0"/>
+              <a:t>Communication is Key</a:t>
+            </a:r>
+            <a:endParaRPr lang="en-US" dirty="0"/>
           </a:p>
           <a:p>
             <a:pPr lvl="1"/>
             <a:r>
               <a:rPr lang="en-US" dirty="0"/>
-              <a:t>CI/CD pipeline (GitHub Actions)</a:t>
-            </a:r>
-          </a:p>
-          <a:p>
-            <a:pPr algn="just"/>
-            <a:r>
-              <a:rPr lang="en-US" b="1" dirty="0"/>
-              <a:t>Access: </a:t>
-            </a:r>
-            <a:r>
-              <a:rPr lang="en-US" dirty="0">
-                <a:hlinkClick r:id="rId2"/>
-              </a:rPr>
-              <a:t>GitHub Repository Link</a:t>
-            </a:r>
+              <a:t>Technical rigor ≠ impact without storytelling</a:t>
+            </a:r>
+          </a:p>
+          <a:p>
+            <a:pPr lvl="1"/>
+            <a:r>
+              <a:rPr lang="en-US" dirty="0"/>
+              <a:t>Dashboard makes analysis actionable</a:t>
+            </a:r>
+          </a:p>
+          <a:p>
+            <a:pPr lvl="1"/>
+            <a:r>
+              <a:rPr lang="en-US" dirty="0"/>
+              <a:t>Modular design enables evolution</a:t>
+            </a:r>
+          </a:p>
+          <a:p>
             <a:endParaRPr lang="en-US" dirty="0"/>
           </a:p>
         </p:txBody>
@@ -7844,7 +7849,7 @@
           <p:cNvPr id="4" name="Slide Number Placeholder 3">
             <a:extLst>
               <a:ext uri="{FF2B5EF4-FFF2-40B4-BE49-F238E27FC236}">
-                <a16:creationId xmlns:a16="http://schemas.microsoft.com/office/drawing/2014/main" id="{3B48F233-FBD4-4844-0CE2-CAA38C71F607}"/>
+                <a16:creationId xmlns:a16="http://schemas.microsoft.com/office/drawing/2014/main" id="{9345A9E1-2E53-7919-FE5B-15BE3EDC145C}"/>
               </a:ext>
             </a:extLst>
           </p:cNvPr>
@@ -7871,7 +7876,7 @@
     </p:spTree>
     <p:extLst>
       <p:ext uri="{BB962C8B-B14F-4D97-AF65-F5344CB8AC3E}">
-        <p14:creationId xmlns:p14="http://schemas.microsoft.com/office/powerpoint/2010/main" val="3279843890"/>
+        <p14:creationId xmlns:p14="http://schemas.microsoft.com/office/powerpoint/2010/main" val="4146011122"/>
       </p:ext>
     </p:extLst>
   </p:cSld>
@@ -8034,6 +8039,22 @@
               </a:rPr>
               <a:t>GitHub</a:t>
             </a:r>
+            <a:r>
+              <a:rPr lang="en-US" dirty="0"/>
+              <a:t> | </a:t>
+            </a:r>
+            <a:r>
+              <a:rPr lang="en-US" dirty="0">
+                <a:hlinkClick r:id="rId5">
+                  <a:extLst>
+                    <a:ext uri="{A12FA001-AC4F-418D-AE19-62706E023703}">
+                      <ahyp:hlinkClr xmlns:ahyp="http://schemas.microsoft.com/office/drawing/2018/hyperlinkcolor" val="tx"/>
+                    </a:ext>
+                  </a:extLst>
+                </a:hlinkClick>
+              </a:rPr>
+              <a:t>Dashboard</a:t>
+            </a:r>
             <a:endParaRPr lang="en-US" dirty="0"/>
           </a:p>
         </p:txBody>
@@ -8082,7 +8103,7 @@
           <p:nvPr/>
         </p:nvPicPr>
         <p:blipFill>
-          <a:blip r:embed="rId5">
+          <a:blip r:embed="rId6">
             <a:extLst>
               <a:ext uri="{28A0092B-C50C-407E-A947-70E740481C1C}">
                 <a14:useLocalDpi xmlns:a14="http://schemas.microsoft.com/office/drawing/2010/main" val="0"/>

</xml_diff>